<commit_message>
* invitation task: modules in 3 separate runs
</commit_message>
<xml_diff>
--- a/public/js/tasks/invitation_task/media/Invitation_Task_Instructions.11.13.2022.pptx
+++ b/public/js/tasks/invitation_task/media/Invitation_Task_Instructions.11.13.2022.pptx
@@ -5,13 +5,15 @@
     <p:sldMasterId id="2147483660" r:id="rId1"/>
   </p:sldMasterIdLst>
   <p:notesMasterIdLst>
-    <p:notesMasterId r:id="rId6"/>
+    <p:notesMasterId r:id="rId8"/>
   </p:notesMasterIdLst>
   <p:sldIdLst>
     <p:sldId id="498" r:id="rId2"/>
-    <p:sldId id="541" r:id="rId3"/>
-    <p:sldId id="534" r:id="rId4"/>
-    <p:sldId id="555" r:id="rId5"/>
+    <p:sldId id="556" r:id="rId3"/>
+    <p:sldId id="557" r:id="rId4"/>
+    <p:sldId id="541" r:id="rId5"/>
+    <p:sldId id="534" r:id="rId6"/>
+    <p:sldId id="555" r:id="rId7"/>
   </p:sldIdLst>
   <p:sldSz cx="12192000" cy="6858000"/>
   <p:notesSz cx="6858000" cy="9144000"/>
@@ -116,6 +118,8 @@
         <p14:section name="Default Section" id="{2FE281D0-C9B0-B940-BBEB-FAAE7C1EDF7A}">
           <p14:sldIdLst>
             <p14:sldId id="498"/>
+            <p14:sldId id="556"/>
+            <p14:sldId id="557"/>
             <p14:sldId id="541"/>
           </p14:sldIdLst>
         </p14:section>
@@ -227,7 +231,7 @@
           <a:p>
             <a:fld id="{5ACDFB13-8C7E-2148-B293-047F9641DD71}" type="datetimeFigureOut">
               <a:rPr lang="en-US" smtClean="0"/>
-              <a:t>11/13/22</a:t>
+              <a:t>1/30/23</a:t>
             </a:fld>
             <a:endParaRPr lang="en-US" dirty="0"/>
           </a:p>
@@ -640,6 +644,14 @@
           <a:bodyPr/>
           <a:lstStyle/>
           <a:p>
+            <a:r>
+              <a:rPr lang="en-US" dirty="0"/>
+              <a:t>Outside</a:t>
+            </a:r>
+            <a:r>
+              <a:rPr lang="en-US" baseline="0" dirty="0"/>
+              <a:t> the scanner</a:t>
+            </a:r>
             <a:endParaRPr lang="en-US" dirty="0"/>
           </a:p>
         </p:txBody>
@@ -659,78 +671,18 @@
           <a:bodyPr/>
           <a:lstStyle/>
           <a:p>
-            <a:pPr marL="0" marR="0" lvl="0" indent="0" algn="r" defTabSz="457200" rtl="0" eaLnBrk="1" fontAlgn="auto" latinLnBrk="0" hangingPunct="1">
-              <a:lnSpc>
-                <a:spcPct val="100000"/>
-              </a:lnSpc>
-              <a:spcBef>
-                <a:spcPts val="0"/>
-              </a:spcBef>
-              <a:spcAft>
-                <a:spcPts val="0"/>
-              </a:spcAft>
-              <a:buClrTx/>
-              <a:buSzTx/>
-              <a:buFontTx/>
-              <a:buNone/>
-              <a:tabLst/>
-              <a:defRPr/>
-            </a:pPr>
             <a:fld id="{BCAE12D7-AE97-9243-8341-9A20FCA5A307}" type="slidenum">
-              <a:rPr kumimoji="0" lang="en-US" sz="1200" b="0" i="0" u="none" strike="noStrike" kern="1200" cap="none" spc="0" normalizeH="0" baseline="0" noProof="0" smtClean="0">
-                <a:ln>
-                  <a:noFill/>
-                </a:ln>
-                <a:solidFill>
-                  <a:prstClr val="black"/>
-                </a:solidFill>
-                <a:effectLst/>
-                <a:uLnTx/>
-                <a:uFillTx/>
-                <a:latin typeface="Calibri"/>
-                <a:ea typeface="+mn-ea"/>
-                <a:cs typeface="+mn-cs"/>
-              </a:rPr>
-              <a:pPr marL="0" marR="0" lvl="0" indent="0" algn="r" defTabSz="457200" rtl="0" eaLnBrk="1" fontAlgn="auto" latinLnBrk="0" hangingPunct="1">
-                <a:lnSpc>
-                  <a:spcPct val="100000"/>
-                </a:lnSpc>
-                <a:spcBef>
-                  <a:spcPts val="0"/>
-                </a:spcBef>
-                <a:spcAft>
-                  <a:spcPts val="0"/>
-                </a:spcAft>
-                <a:buClrTx/>
-                <a:buSzTx/>
-                <a:buFontTx/>
-                <a:buNone/>
-                <a:tabLst/>
-                <a:defRPr/>
-              </a:pPr>
+              <a:rPr lang="en-US" smtClean="0"/>
               <a:t>2</a:t>
             </a:fld>
-            <a:endParaRPr kumimoji="0" lang="en-US" sz="1200" b="0" i="0" u="none" strike="noStrike" kern="1200" cap="none" spc="0" normalizeH="0" baseline="0" noProof="0">
-              <a:ln>
-                <a:noFill/>
-              </a:ln>
-              <a:solidFill>
-                <a:prstClr val="black"/>
-              </a:solidFill>
-              <a:effectLst/>
-              <a:uLnTx/>
-              <a:uFillTx/>
-              <a:latin typeface="Calibri"/>
-              <a:ea typeface="+mn-ea"/>
-              <a:cs typeface="+mn-cs"/>
-            </a:endParaRPr>
+            <a:endParaRPr lang="en-US"/>
           </a:p>
         </p:txBody>
       </p:sp>
     </p:spTree>
     <p:extLst>
       <p:ext uri="{BB962C8B-B14F-4D97-AF65-F5344CB8AC3E}">
-        <p14:creationId xmlns:p14="http://schemas.microsoft.com/office/powerpoint/2010/main" val="1461150046"/>
+        <p14:creationId xmlns:p14="http://schemas.microsoft.com/office/powerpoint/2010/main" val="118047650"/>
       </p:ext>
     </p:extLst>
   </p:cSld>
@@ -789,6 +741,14 @@
           <a:bodyPr/>
           <a:lstStyle/>
           <a:p>
+            <a:r>
+              <a:rPr lang="en-US" dirty="0"/>
+              <a:t>Outside</a:t>
+            </a:r>
+            <a:r>
+              <a:rPr lang="en-US" baseline="0" dirty="0"/>
+              <a:t> the scanner</a:t>
+            </a:r>
             <a:endParaRPr lang="en-US" dirty="0"/>
           </a:p>
         </p:txBody>
@@ -808,78 +768,18 @@
           <a:bodyPr/>
           <a:lstStyle/>
           <a:p>
-            <a:pPr marL="0" marR="0" lvl="0" indent="0" algn="r" defTabSz="457200" rtl="0" eaLnBrk="1" fontAlgn="auto" latinLnBrk="0" hangingPunct="1">
-              <a:lnSpc>
-                <a:spcPct val="100000"/>
-              </a:lnSpc>
-              <a:spcBef>
-                <a:spcPts val="0"/>
-              </a:spcBef>
-              <a:spcAft>
-                <a:spcPts val="0"/>
-              </a:spcAft>
-              <a:buClrTx/>
-              <a:buSzTx/>
-              <a:buFontTx/>
-              <a:buNone/>
-              <a:tabLst/>
-              <a:defRPr/>
-            </a:pPr>
             <a:fld id="{BCAE12D7-AE97-9243-8341-9A20FCA5A307}" type="slidenum">
-              <a:rPr kumimoji="0" lang="en-US" sz="1200" b="0" i="0" u="none" strike="noStrike" kern="1200" cap="none" spc="0" normalizeH="0" baseline="0" noProof="0" smtClean="0">
-                <a:ln>
-                  <a:noFill/>
-                </a:ln>
-                <a:solidFill>
-                  <a:prstClr val="black"/>
-                </a:solidFill>
-                <a:effectLst/>
-                <a:uLnTx/>
-                <a:uFillTx/>
-                <a:latin typeface="Calibri"/>
-                <a:ea typeface="+mn-ea"/>
-                <a:cs typeface="+mn-cs"/>
-              </a:rPr>
-              <a:pPr marL="0" marR="0" lvl="0" indent="0" algn="r" defTabSz="457200" rtl="0" eaLnBrk="1" fontAlgn="auto" latinLnBrk="0" hangingPunct="1">
-                <a:lnSpc>
-                  <a:spcPct val="100000"/>
-                </a:lnSpc>
-                <a:spcBef>
-                  <a:spcPts val="0"/>
-                </a:spcBef>
-                <a:spcAft>
-                  <a:spcPts val="0"/>
-                </a:spcAft>
-                <a:buClrTx/>
-                <a:buSzTx/>
-                <a:buFontTx/>
-                <a:buNone/>
-                <a:tabLst/>
-                <a:defRPr/>
-              </a:pPr>
+              <a:rPr lang="en-US" smtClean="0"/>
               <a:t>3</a:t>
             </a:fld>
-            <a:endParaRPr kumimoji="0" lang="en-US" sz="1200" b="0" i="0" u="none" strike="noStrike" kern="1200" cap="none" spc="0" normalizeH="0" baseline="0" noProof="0">
-              <a:ln>
-                <a:noFill/>
-              </a:ln>
-              <a:solidFill>
-                <a:prstClr val="black"/>
-              </a:solidFill>
-              <a:effectLst/>
-              <a:uLnTx/>
-              <a:uFillTx/>
-              <a:latin typeface="Calibri"/>
-              <a:ea typeface="+mn-ea"/>
-              <a:cs typeface="+mn-cs"/>
-            </a:endParaRPr>
+            <a:endParaRPr lang="en-US"/>
           </a:p>
         </p:txBody>
       </p:sp>
     </p:spTree>
     <p:extLst>
       <p:ext uri="{BB962C8B-B14F-4D97-AF65-F5344CB8AC3E}">
-        <p14:creationId xmlns:p14="http://schemas.microsoft.com/office/powerpoint/2010/main" val="4266951294"/>
+        <p14:creationId xmlns:p14="http://schemas.microsoft.com/office/powerpoint/2010/main" val="65659535"/>
       </p:ext>
     </p:extLst>
   </p:cSld>
@@ -1028,6 +928,304 @@
     </p:spTree>
     <p:extLst>
       <p:ext uri="{BB962C8B-B14F-4D97-AF65-F5344CB8AC3E}">
+        <p14:creationId xmlns:p14="http://schemas.microsoft.com/office/powerpoint/2010/main" val="1461150046"/>
+      </p:ext>
+    </p:extLst>
+  </p:cSld>
+  <p:clrMapOvr>
+    <a:masterClrMapping/>
+  </p:clrMapOvr>
+</p:notes>
+</file>
+
+<file path=ppt/notesSlides/notesSlide5.xml><?xml version="1.0" encoding="utf-8"?>
+<p:notes xmlns:a="http://schemas.openxmlformats.org/drawingml/2006/main" xmlns:r="http://schemas.openxmlformats.org/officeDocument/2006/relationships" xmlns:p="http://schemas.openxmlformats.org/presentationml/2006/main">
+  <p:cSld>
+    <p:spTree>
+      <p:nvGrpSpPr>
+        <p:cNvPr id="1" name=""/>
+        <p:cNvGrpSpPr/>
+        <p:nvPr/>
+      </p:nvGrpSpPr>
+      <p:grpSpPr>
+        <a:xfrm>
+          <a:off x="0" y="0"/>
+          <a:ext cx="0" cy="0"/>
+          <a:chOff x="0" y="0"/>
+          <a:chExt cx="0" cy="0"/>
+        </a:xfrm>
+      </p:grpSpPr>
+      <p:sp>
+        <p:nvSpPr>
+          <p:cNvPr id="2" name="Slide Image Placeholder 1"/>
+          <p:cNvSpPr>
+            <a:spLocks noGrp="1" noRot="1" noChangeAspect="1"/>
+          </p:cNvSpPr>
+          <p:nvPr>
+            <p:ph type="sldImg"/>
+          </p:nvPr>
+        </p:nvSpPr>
+        <p:spPr>
+          <a:xfrm>
+            <a:off x="381000" y="685800"/>
+            <a:ext cx="6096000" cy="3429000"/>
+          </a:xfrm>
+        </p:spPr>
+      </p:sp>
+      <p:sp>
+        <p:nvSpPr>
+          <p:cNvPr id="3" name="Notes Placeholder 2"/>
+          <p:cNvSpPr>
+            <a:spLocks noGrp="1"/>
+          </p:cNvSpPr>
+          <p:nvPr>
+            <p:ph type="body" idx="1"/>
+          </p:nvPr>
+        </p:nvSpPr>
+        <p:spPr/>
+        <p:txBody>
+          <a:bodyPr/>
+          <a:lstStyle/>
+          <a:p>
+            <a:endParaRPr lang="en-US" dirty="0"/>
+          </a:p>
+        </p:txBody>
+      </p:sp>
+      <p:sp>
+        <p:nvSpPr>
+          <p:cNvPr id="4" name="Slide Number Placeholder 3"/>
+          <p:cNvSpPr>
+            <a:spLocks noGrp="1"/>
+          </p:cNvSpPr>
+          <p:nvPr>
+            <p:ph type="sldNum" sz="quarter" idx="10"/>
+          </p:nvPr>
+        </p:nvSpPr>
+        <p:spPr/>
+        <p:txBody>
+          <a:bodyPr/>
+          <a:lstStyle/>
+          <a:p>
+            <a:pPr marL="0" marR="0" lvl="0" indent="0" algn="r" defTabSz="457200" rtl="0" eaLnBrk="1" fontAlgn="auto" latinLnBrk="0" hangingPunct="1">
+              <a:lnSpc>
+                <a:spcPct val="100000"/>
+              </a:lnSpc>
+              <a:spcBef>
+                <a:spcPts val="0"/>
+              </a:spcBef>
+              <a:spcAft>
+                <a:spcPts val="0"/>
+              </a:spcAft>
+              <a:buClrTx/>
+              <a:buSzTx/>
+              <a:buFontTx/>
+              <a:buNone/>
+              <a:tabLst/>
+              <a:defRPr/>
+            </a:pPr>
+            <a:fld id="{BCAE12D7-AE97-9243-8341-9A20FCA5A307}" type="slidenum">
+              <a:rPr kumimoji="0" lang="en-US" sz="1200" b="0" i="0" u="none" strike="noStrike" kern="1200" cap="none" spc="0" normalizeH="0" baseline="0" noProof="0" smtClean="0">
+                <a:ln>
+                  <a:noFill/>
+                </a:ln>
+                <a:solidFill>
+                  <a:prstClr val="black"/>
+                </a:solidFill>
+                <a:effectLst/>
+                <a:uLnTx/>
+                <a:uFillTx/>
+                <a:latin typeface="Calibri"/>
+                <a:ea typeface="+mn-ea"/>
+                <a:cs typeface="+mn-cs"/>
+              </a:rPr>
+              <a:pPr marL="0" marR="0" lvl="0" indent="0" algn="r" defTabSz="457200" rtl="0" eaLnBrk="1" fontAlgn="auto" latinLnBrk="0" hangingPunct="1">
+                <a:lnSpc>
+                  <a:spcPct val="100000"/>
+                </a:lnSpc>
+                <a:spcBef>
+                  <a:spcPts val="0"/>
+                </a:spcBef>
+                <a:spcAft>
+                  <a:spcPts val="0"/>
+                </a:spcAft>
+                <a:buClrTx/>
+                <a:buSzTx/>
+                <a:buFontTx/>
+                <a:buNone/>
+                <a:tabLst/>
+                <a:defRPr/>
+              </a:pPr>
+              <a:t>5</a:t>
+            </a:fld>
+            <a:endParaRPr kumimoji="0" lang="en-US" sz="1200" b="0" i="0" u="none" strike="noStrike" kern="1200" cap="none" spc="0" normalizeH="0" baseline="0" noProof="0">
+              <a:ln>
+                <a:noFill/>
+              </a:ln>
+              <a:solidFill>
+                <a:prstClr val="black"/>
+              </a:solidFill>
+              <a:effectLst/>
+              <a:uLnTx/>
+              <a:uFillTx/>
+              <a:latin typeface="Calibri"/>
+              <a:ea typeface="+mn-ea"/>
+              <a:cs typeface="+mn-cs"/>
+            </a:endParaRPr>
+          </a:p>
+        </p:txBody>
+      </p:sp>
+    </p:spTree>
+    <p:extLst>
+      <p:ext uri="{BB962C8B-B14F-4D97-AF65-F5344CB8AC3E}">
+        <p14:creationId xmlns:p14="http://schemas.microsoft.com/office/powerpoint/2010/main" val="4266951294"/>
+      </p:ext>
+    </p:extLst>
+  </p:cSld>
+  <p:clrMapOvr>
+    <a:masterClrMapping/>
+  </p:clrMapOvr>
+</p:notes>
+</file>
+
+<file path=ppt/notesSlides/notesSlide6.xml><?xml version="1.0" encoding="utf-8"?>
+<p:notes xmlns:a="http://schemas.openxmlformats.org/drawingml/2006/main" xmlns:r="http://schemas.openxmlformats.org/officeDocument/2006/relationships" xmlns:p="http://schemas.openxmlformats.org/presentationml/2006/main">
+  <p:cSld>
+    <p:spTree>
+      <p:nvGrpSpPr>
+        <p:cNvPr id="1" name=""/>
+        <p:cNvGrpSpPr/>
+        <p:nvPr/>
+      </p:nvGrpSpPr>
+      <p:grpSpPr>
+        <a:xfrm>
+          <a:off x="0" y="0"/>
+          <a:ext cx="0" cy="0"/>
+          <a:chOff x="0" y="0"/>
+          <a:chExt cx="0" cy="0"/>
+        </a:xfrm>
+      </p:grpSpPr>
+      <p:sp>
+        <p:nvSpPr>
+          <p:cNvPr id="2" name="Slide Image Placeholder 1"/>
+          <p:cNvSpPr>
+            <a:spLocks noGrp="1" noRot="1" noChangeAspect="1"/>
+          </p:cNvSpPr>
+          <p:nvPr>
+            <p:ph type="sldImg"/>
+          </p:nvPr>
+        </p:nvSpPr>
+        <p:spPr>
+          <a:xfrm>
+            <a:off x="381000" y="685800"/>
+            <a:ext cx="6096000" cy="3429000"/>
+          </a:xfrm>
+        </p:spPr>
+      </p:sp>
+      <p:sp>
+        <p:nvSpPr>
+          <p:cNvPr id="3" name="Notes Placeholder 2"/>
+          <p:cNvSpPr>
+            <a:spLocks noGrp="1"/>
+          </p:cNvSpPr>
+          <p:nvPr>
+            <p:ph type="body" idx="1"/>
+          </p:nvPr>
+        </p:nvSpPr>
+        <p:spPr/>
+        <p:txBody>
+          <a:bodyPr/>
+          <a:lstStyle/>
+          <a:p>
+            <a:endParaRPr lang="en-US" dirty="0"/>
+          </a:p>
+        </p:txBody>
+      </p:sp>
+      <p:sp>
+        <p:nvSpPr>
+          <p:cNvPr id="4" name="Slide Number Placeholder 3"/>
+          <p:cNvSpPr>
+            <a:spLocks noGrp="1"/>
+          </p:cNvSpPr>
+          <p:nvPr>
+            <p:ph type="sldNum" sz="quarter" idx="10"/>
+          </p:nvPr>
+        </p:nvSpPr>
+        <p:spPr/>
+        <p:txBody>
+          <a:bodyPr/>
+          <a:lstStyle/>
+          <a:p>
+            <a:pPr marL="0" marR="0" lvl="0" indent="0" algn="r" defTabSz="457200" rtl="0" eaLnBrk="1" fontAlgn="auto" latinLnBrk="0" hangingPunct="1">
+              <a:lnSpc>
+                <a:spcPct val="100000"/>
+              </a:lnSpc>
+              <a:spcBef>
+                <a:spcPts val="0"/>
+              </a:spcBef>
+              <a:spcAft>
+                <a:spcPts val="0"/>
+              </a:spcAft>
+              <a:buClrTx/>
+              <a:buSzTx/>
+              <a:buFontTx/>
+              <a:buNone/>
+              <a:tabLst/>
+              <a:defRPr/>
+            </a:pPr>
+            <a:fld id="{BCAE12D7-AE97-9243-8341-9A20FCA5A307}" type="slidenum">
+              <a:rPr kumimoji="0" lang="en-US" sz="1200" b="0" i="0" u="none" strike="noStrike" kern="1200" cap="none" spc="0" normalizeH="0" baseline="0" noProof="0" smtClean="0">
+                <a:ln>
+                  <a:noFill/>
+                </a:ln>
+                <a:solidFill>
+                  <a:prstClr val="black"/>
+                </a:solidFill>
+                <a:effectLst/>
+                <a:uLnTx/>
+                <a:uFillTx/>
+                <a:latin typeface="Calibri"/>
+                <a:ea typeface="+mn-ea"/>
+                <a:cs typeface="+mn-cs"/>
+              </a:rPr>
+              <a:pPr marL="0" marR="0" lvl="0" indent="0" algn="r" defTabSz="457200" rtl="0" eaLnBrk="1" fontAlgn="auto" latinLnBrk="0" hangingPunct="1">
+                <a:lnSpc>
+                  <a:spcPct val="100000"/>
+                </a:lnSpc>
+                <a:spcBef>
+                  <a:spcPts val="0"/>
+                </a:spcBef>
+                <a:spcAft>
+                  <a:spcPts val="0"/>
+                </a:spcAft>
+                <a:buClrTx/>
+                <a:buSzTx/>
+                <a:buFontTx/>
+                <a:buNone/>
+                <a:tabLst/>
+                <a:defRPr/>
+              </a:pPr>
+              <a:t>6</a:t>
+            </a:fld>
+            <a:endParaRPr kumimoji="0" lang="en-US" sz="1200" b="0" i="0" u="none" strike="noStrike" kern="1200" cap="none" spc="0" normalizeH="0" baseline="0" noProof="0">
+              <a:ln>
+                <a:noFill/>
+              </a:ln>
+              <a:solidFill>
+                <a:prstClr val="black"/>
+              </a:solidFill>
+              <a:effectLst/>
+              <a:uLnTx/>
+              <a:uFillTx/>
+              <a:latin typeface="Calibri"/>
+              <a:ea typeface="+mn-ea"/>
+              <a:cs typeface="+mn-cs"/>
+            </a:endParaRPr>
+          </a:p>
+        </p:txBody>
+      </p:sp>
+    </p:spTree>
+    <p:extLst>
+      <p:ext uri="{BB962C8B-B14F-4D97-AF65-F5344CB8AC3E}">
         <p14:creationId xmlns:p14="http://schemas.microsoft.com/office/powerpoint/2010/main" val="469043473"/>
       </p:ext>
     </p:extLst>
@@ -1217,7 +1415,7 @@
           <a:p>
             <a:fld id="{E69A4D3A-6EF8-7448-AC6F-AD52FEDAA6A8}" type="datetimeFigureOut">
               <a:rPr lang="en-US" smtClean="0"/>
-              <a:t>11/13/22</a:t>
+              <a:t>1/30/23</a:t>
             </a:fld>
             <a:endParaRPr lang="en-US" dirty="0"/>
           </a:p>
@@ -1385,7 +1583,7 @@
           <a:p>
             <a:fld id="{E69A4D3A-6EF8-7448-AC6F-AD52FEDAA6A8}" type="datetimeFigureOut">
               <a:rPr lang="en-US" smtClean="0"/>
-              <a:t>11/13/22</a:t>
+              <a:t>1/30/23</a:t>
             </a:fld>
             <a:endParaRPr lang="en-US" dirty="0"/>
           </a:p>
@@ -1563,7 +1761,7 @@
           <a:p>
             <a:fld id="{E69A4D3A-6EF8-7448-AC6F-AD52FEDAA6A8}" type="datetimeFigureOut">
               <a:rPr lang="en-US" smtClean="0"/>
-              <a:t>11/13/22</a:t>
+              <a:t>1/30/23</a:t>
             </a:fld>
             <a:endParaRPr lang="en-US" dirty="0"/>
           </a:p>
@@ -1731,7 +1929,7 @@
           <a:p>
             <a:fld id="{E69A4D3A-6EF8-7448-AC6F-AD52FEDAA6A8}" type="datetimeFigureOut">
               <a:rPr lang="en-US" smtClean="0"/>
-              <a:t>11/13/22</a:t>
+              <a:t>1/30/23</a:t>
             </a:fld>
             <a:endParaRPr lang="en-US" dirty="0"/>
           </a:p>
@@ -1976,7 +2174,7 @@
           <a:p>
             <a:fld id="{E69A4D3A-6EF8-7448-AC6F-AD52FEDAA6A8}" type="datetimeFigureOut">
               <a:rPr lang="en-US" smtClean="0"/>
-              <a:t>11/13/22</a:t>
+              <a:t>1/30/23</a:t>
             </a:fld>
             <a:endParaRPr lang="en-US" dirty="0"/>
           </a:p>
@@ -2261,7 +2459,7 @@
           <a:p>
             <a:fld id="{E69A4D3A-6EF8-7448-AC6F-AD52FEDAA6A8}" type="datetimeFigureOut">
               <a:rPr lang="en-US" smtClean="0"/>
-              <a:t>11/13/22</a:t>
+              <a:t>1/30/23</a:t>
             </a:fld>
             <a:endParaRPr lang="en-US" dirty="0"/>
           </a:p>
@@ -2680,7 +2878,7 @@
           <a:p>
             <a:fld id="{E69A4D3A-6EF8-7448-AC6F-AD52FEDAA6A8}" type="datetimeFigureOut">
               <a:rPr lang="en-US" smtClean="0"/>
-              <a:t>11/13/22</a:t>
+              <a:t>1/30/23</a:t>
             </a:fld>
             <a:endParaRPr lang="en-US" dirty="0"/>
           </a:p>
@@ -2797,7 +2995,7 @@
           <a:p>
             <a:fld id="{E69A4D3A-6EF8-7448-AC6F-AD52FEDAA6A8}" type="datetimeFigureOut">
               <a:rPr lang="en-US" smtClean="0"/>
-              <a:t>11/13/22</a:t>
+              <a:t>1/30/23</a:t>
             </a:fld>
             <a:endParaRPr lang="en-US" dirty="0"/>
           </a:p>
@@ -2892,7 +3090,7 @@
           <a:p>
             <a:fld id="{E69A4D3A-6EF8-7448-AC6F-AD52FEDAA6A8}" type="datetimeFigureOut">
               <a:rPr lang="en-US" smtClean="0"/>
-              <a:t>11/13/22</a:t>
+              <a:t>1/30/23</a:t>
             </a:fld>
             <a:endParaRPr lang="en-US" dirty="0"/>
           </a:p>
@@ -3167,7 +3365,7 @@
           <a:p>
             <a:fld id="{E69A4D3A-6EF8-7448-AC6F-AD52FEDAA6A8}" type="datetimeFigureOut">
               <a:rPr lang="en-US" smtClean="0"/>
-              <a:t>11/13/22</a:t>
+              <a:t>1/30/23</a:t>
             </a:fld>
             <a:endParaRPr lang="en-US" dirty="0"/>
           </a:p>
@@ -3422,7 +3620,7 @@
           <a:p>
             <a:fld id="{E69A4D3A-6EF8-7448-AC6F-AD52FEDAA6A8}" type="datetimeFigureOut">
               <a:rPr lang="en-US" smtClean="0"/>
-              <a:t>11/13/22</a:t>
+              <a:t>1/30/23</a:t>
             </a:fld>
             <a:endParaRPr lang="en-US" dirty="0"/>
           </a:p>
@@ -3636,7 +3834,7 @@
           <a:p>
             <a:fld id="{E69A4D3A-6EF8-7448-AC6F-AD52FEDAA6A8}" type="datetimeFigureOut">
               <a:rPr lang="en-US" smtClean="0"/>
-              <a:t>11/13/22</a:t>
+              <a:t>1/30/23</a:t>
             </a:fld>
             <a:endParaRPr lang="en-US" dirty="0"/>
           </a:p>
@@ -4382,7 +4580,7 @@
             <a:pPr algn="ctr"/>
             <a:r>
               <a:rPr lang="en-US" sz="2400" dirty="0"/>
-              <a:t>RUN 1</a:t>
+              <a:t>Practice Run 1</a:t>
             </a:r>
           </a:p>
         </p:txBody>
@@ -4419,7 +4617,36 @@
       </p:grpSpPr>
       <p:sp>
         <p:nvSpPr>
-          <p:cNvPr id="26" name="Title 3"/>
+          <p:cNvPr id="4" name="Title 3"/>
+          <p:cNvSpPr>
+            <a:spLocks noGrp="1"/>
+          </p:cNvSpPr>
+          <p:nvPr>
+            <p:ph type="ctrTitle"/>
+          </p:nvPr>
+        </p:nvSpPr>
+        <p:spPr>
+          <a:xfrm>
+            <a:off x="1866900" y="1818277"/>
+            <a:ext cx="8458200" cy="1470025"/>
+          </a:xfrm>
+        </p:spPr>
+        <p:txBody>
+          <a:bodyPr>
+            <a:normAutofit/>
+          </a:bodyPr>
+          <a:lstStyle/>
+          <a:p>
+            <a:r>
+              <a:rPr lang="en-US" sz="4800" dirty="0"/>
+              <a:t>Invitation Task</a:t>
+            </a:r>
+          </a:p>
+        </p:txBody>
+      </p:sp>
+      <p:sp>
+        <p:nvSpPr>
+          <p:cNvPr id="7" name="Title 3"/>
           <p:cNvSpPr txBox="1">
             <a:spLocks/>
           </p:cNvSpPr>
@@ -4455,65 +4682,13 @@
             </a:lvl1pPr>
           </a:lstStyle>
           <a:p>
-            <a:pPr marL="0" marR="0" lvl="0" indent="0" algn="ctr" defTabSz="914400" rtl="0" eaLnBrk="1" fontAlgn="auto" latinLnBrk="0" hangingPunct="1">
-              <a:lnSpc>
-                <a:spcPct val="100000"/>
-              </a:lnSpc>
-              <a:spcBef>
-                <a:spcPct val="0"/>
-              </a:spcBef>
-              <a:spcAft>
-                <a:spcPts val="0"/>
-              </a:spcAft>
-              <a:buClrTx/>
-              <a:buSzTx/>
-              <a:buFontTx/>
-              <a:buNone/>
-              <a:tabLst/>
-              <a:defRPr/>
-            </a:pPr>
-            <a:r>
-              <a:rPr kumimoji="0" lang="en-US" sz="3000" b="0" i="0" u="none" strike="noStrike" kern="1200" cap="none" spc="0" normalizeH="0" baseline="0" noProof="0" dirty="0">
-                <a:ln>
-                  <a:noFill/>
-                </a:ln>
+            <a:r>
+              <a:rPr lang="en-US" sz="3000" dirty="0">
                 <a:solidFill>
                   <a:srgbClr val="FF0000"/>
                 </a:solidFill>
-                <a:effectLst/>
-                <a:uLnTx/>
-                <a:uFillTx/>
-                <a:latin typeface="Calibri"/>
-                <a:ea typeface="+mj-ea"/>
-                <a:cs typeface="+mj-cs"/>
               </a:rPr>
-              <a:t>PRESS THE RIGHT </a:t>
-            </a:r>
-            <a:r>
-              <a:rPr lang="en-US" sz="3000" dirty="0">
-                <a:solidFill>
-                  <a:srgbClr val="FF0000"/>
-                </a:solidFill>
-                <a:latin typeface="Calibri"/>
-              </a:rPr>
-              <a:t>KEY</a:t>
-            </a:r>
-            <a:r>
-              <a:rPr kumimoji="0" lang="en-US" sz="3000" b="0" i="0" u="none" strike="noStrike" kern="1200" cap="none" spc="0" normalizeH="0" baseline="0" noProof="0" dirty="0">
-                <a:ln>
-                  <a:noFill/>
-                </a:ln>
-                <a:solidFill>
-                  <a:srgbClr val="FF0000"/>
-                </a:solidFill>
-                <a:effectLst/>
-                <a:uLnTx/>
-                <a:uFillTx/>
-                <a:latin typeface="Calibri"/>
-                <a:ea typeface="+mj-ea"/>
-                <a:cs typeface="+mj-cs"/>
-              </a:rPr>
-              <a:t> TO CONTINUE</a:t>
+              <a:t>PRESS THE RIGHT BUTTON TO CONTINUE</a:t>
             </a:r>
           </a:p>
         </p:txBody>
@@ -4695,37 +4870,11 @@
             </a:lvl9pPr>
           </a:lstStyle>
           <a:p>
-            <a:pPr marL="0" marR="0" lvl="0" indent="0" algn="ctr" defTabSz="914400" rtl="0" eaLnBrk="1" fontAlgn="auto" latinLnBrk="0" hangingPunct="1">
-              <a:lnSpc>
-                <a:spcPct val="100000"/>
-              </a:lnSpc>
-              <a:spcBef>
-                <a:spcPct val="20000"/>
-              </a:spcBef>
-              <a:spcAft>
-                <a:spcPts val="0"/>
-              </a:spcAft>
-              <a:buClrTx/>
-              <a:buSzTx/>
-              <a:buFont typeface="Arial" pitchFamily="34" charset="0"/>
-              <a:buNone/>
-              <a:tabLst/>
-              <a:defRPr/>
-            </a:pPr>
-            <a:r>
-              <a:rPr kumimoji="0" lang="en-US" sz="1600" b="0" i="0" u="none" strike="noStrike" kern="1200" cap="none" spc="0" normalizeH="0" baseline="0" noProof="0" dirty="0">
-                <a:ln>
-                  <a:noFill/>
-                </a:ln>
-                <a:solidFill>
-                  <a:prstClr val="white"/>
-                </a:solidFill>
-                <a:effectLst/>
-                <a:uLnTx/>
-                <a:uFillTx/>
-                <a:latin typeface="Calibri"/>
-                <a:ea typeface="+mn-ea"/>
-                <a:cs typeface="+mn-cs"/>
+            <a:r>
+              <a:rPr lang="en-US" sz="1600" dirty="0">
+                <a:solidFill>
+                  <a:schemeClr val="tx1"/>
+                </a:solidFill>
               </a:rPr>
               <a:t>RIGHT</a:t>
             </a:r>
@@ -4771,6 +4920,867 @@
           <a:bodyPr rtlCol="0" anchor="ctr"/>
           <a:lstStyle/>
           <a:p>
+            <a:pPr algn="ctr"/>
+            <a:endParaRPr lang="en-US"/>
+          </a:p>
+        </p:txBody>
+      </p:sp>
+      <p:pic>
+        <p:nvPicPr>
+          <p:cNvPr id="9" name="Picture 8"/>
+          <p:cNvPicPr>
+            <a:picLocks noChangeAspect="1"/>
+          </p:cNvPicPr>
+          <p:nvPr/>
+        </p:nvPicPr>
+        <p:blipFill>
+          <a:blip r:embed="rId3">
+            <a:extLst>
+              <a:ext uri="{28A0092B-C50C-407E-A947-70E740481C1C}">
+                <a14:useLocalDpi xmlns:a14="http://schemas.microsoft.com/office/drawing/2010/main" val="0"/>
+              </a:ext>
+            </a:extLst>
+          </a:blip>
+          <a:stretch>
+            <a:fillRect/>
+          </a:stretch>
+        </p:blipFill>
+        <p:spPr>
+          <a:xfrm>
+            <a:off x="10277518" y="176410"/>
+            <a:ext cx="1760561" cy="333863"/>
+          </a:xfrm>
+          <a:prstGeom prst="rect">
+            <a:avLst/>
+          </a:prstGeom>
+        </p:spPr>
+      </p:pic>
+      <p:sp>
+        <p:nvSpPr>
+          <p:cNvPr id="8" name="TextBox 7">
+            <a:extLst>
+              <a:ext uri="{FF2B5EF4-FFF2-40B4-BE49-F238E27FC236}">
+                <a16:creationId xmlns:a16="http://schemas.microsoft.com/office/drawing/2014/main" id="{5D6AEEAA-9552-114D-B68D-6A46C8AC67A9}"/>
+              </a:ext>
+            </a:extLst>
+          </p:cNvPr>
+          <p:cNvSpPr txBox="1"/>
+          <p:nvPr/>
+        </p:nvSpPr>
+        <p:spPr>
+          <a:xfrm>
+            <a:off x="4396393" y="5612179"/>
+            <a:ext cx="3399213" cy="461665"/>
+          </a:xfrm>
+          <a:prstGeom prst="rect">
+            <a:avLst/>
+          </a:prstGeom>
+          <a:noFill/>
+        </p:spPr>
+        <p:txBody>
+          <a:bodyPr wrap="square" rtlCol="0">
+            <a:spAutoFit/>
+          </a:bodyPr>
+          <a:lstStyle/>
+          <a:p>
+            <a:pPr algn="ctr"/>
+            <a:r>
+              <a:rPr lang="en-US" sz="2400" dirty="0"/>
+              <a:t>Practice Run 2</a:t>
+            </a:r>
+          </a:p>
+        </p:txBody>
+      </p:sp>
+    </p:spTree>
+    <p:extLst>
+      <p:ext uri="{BB962C8B-B14F-4D97-AF65-F5344CB8AC3E}">
+        <p14:creationId xmlns:p14="http://schemas.microsoft.com/office/powerpoint/2010/main" val="3552026985"/>
+      </p:ext>
+    </p:extLst>
+  </p:cSld>
+  <p:clrMapOvr>
+    <a:masterClrMapping/>
+  </p:clrMapOvr>
+</p:sld>
+</file>
+
+<file path=ppt/slides/slide3.xml><?xml version="1.0" encoding="utf-8"?>
+<p:sld xmlns:a="http://schemas.openxmlformats.org/drawingml/2006/main" xmlns:r="http://schemas.openxmlformats.org/officeDocument/2006/relationships" xmlns:p="http://schemas.openxmlformats.org/presentationml/2006/main">
+  <p:cSld>
+    <p:spTree>
+      <p:nvGrpSpPr>
+        <p:cNvPr id="1" name=""/>
+        <p:cNvGrpSpPr/>
+        <p:nvPr/>
+      </p:nvGrpSpPr>
+      <p:grpSpPr>
+        <a:xfrm>
+          <a:off x="0" y="0"/>
+          <a:ext cx="0" cy="0"/>
+          <a:chOff x="0" y="0"/>
+          <a:chExt cx="0" cy="0"/>
+        </a:xfrm>
+      </p:grpSpPr>
+      <p:sp>
+        <p:nvSpPr>
+          <p:cNvPr id="4" name="Title 3"/>
+          <p:cNvSpPr>
+            <a:spLocks noGrp="1"/>
+          </p:cNvSpPr>
+          <p:nvPr>
+            <p:ph type="ctrTitle"/>
+          </p:nvPr>
+        </p:nvSpPr>
+        <p:spPr>
+          <a:xfrm>
+            <a:off x="1866900" y="1818277"/>
+            <a:ext cx="8458200" cy="1470025"/>
+          </a:xfrm>
+        </p:spPr>
+        <p:txBody>
+          <a:bodyPr>
+            <a:normAutofit/>
+          </a:bodyPr>
+          <a:lstStyle/>
+          <a:p>
+            <a:r>
+              <a:rPr lang="en-US" sz="4800" dirty="0"/>
+              <a:t>Invitation Task</a:t>
+            </a:r>
+          </a:p>
+        </p:txBody>
+      </p:sp>
+      <p:sp>
+        <p:nvSpPr>
+          <p:cNvPr id="7" name="Title 3"/>
+          <p:cNvSpPr txBox="1">
+            <a:spLocks/>
+          </p:cNvSpPr>
+          <p:nvPr/>
+        </p:nvSpPr>
+        <p:spPr>
+          <a:xfrm>
+            <a:off x="1524000" y="6201295"/>
+            <a:ext cx="9149174" cy="656705"/>
+          </a:xfrm>
+          <a:prstGeom prst="rect">
+            <a:avLst/>
+          </a:prstGeom>
+        </p:spPr>
+        <p:txBody>
+          <a:bodyPr vert="horz" lIns="91440" tIns="45720" rIns="91440" bIns="45720" rtlCol="0" anchor="ctr">
+            <a:normAutofit/>
+          </a:bodyPr>
+          <a:lstStyle>
+            <a:lvl1pPr algn="ctr" defTabSz="914400" rtl="0" eaLnBrk="1" latinLnBrk="0" hangingPunct="1">
+              <a:spcBef>
+                <a:spcPct val="0"/>
+              </a:spcBef>
+              <a:buNone/>
+              <a:defRPr sz="4400" kern="1200">
+                <a:solidFill>
+                  <a:schemeClr val="tx1"/>
+                </a:solidFill>
+                <a:latin typeface="+mj-lt"/>
+                <a:ea typeface="+mj-ea"/>
+                <a:cs typeface="+mj-cs"/>
+              </a:defRPr>
+            </a:lvl1pPr>
+          </a:lstStyle>
+          <a:p>
+            <a:r>
+              <a:rPr lang="en-US" sz="3000" dirty="0">
+                <a:solidFill>
+                  <a:srgbClr val="FF0000"/>
+                </a:solidFill>
+              </a:rPr>
+              <a:t>PRESS THE RIGHT BUTTON TO CONTINUE</a:t>
+            </a:r>
+          </a:p>
+        </p:txBody>
+      </p:sp>
+      <p:sp>
+        <p:nvSpPr>
+          <p:cNvPr id="12" name="Subtitle 8"/>
+          <p:cNvSpPr txBox="1">
+            <a:spLocks/>
+          </p:cNvSpPr>
+          <p:nvPr/>
+        </p:nvSpPr>
+        <p:spPr>
+          <a:xfrm>
+            <a:off x="9140345" y="6073844"/>
+            <a:ext cx="1532830" cy="801636"/>
+          </a:xfrm>
+          <a:prstGeom prst="rect">
+            <a:avLst/>
+          </a:prstGeom>
+        </p:spPr>
+        <p:txBody>
+          <a:bodyPr vert="horz" lIns="91440" tIns="45720" rIns="91440" bIns="45720" rtlCol="0">
+            <a:normAutofit/>
+          </a:bodyPr>
+          <a:lstStyle>
+            <a:lvl1pPr marL="0" indent="0" algn="ctr" defTabSz="914400" rtl="0" eaLnBrk="1" latinLnBrk="0" hangingPunct="1">
+              <a:spcBef>
+                <a:spcPct val="20000"/>
+              </a:spcBef>
+              <a:buFont typeface="Arial" pitchFamily="34" charset="0"/>
+              <a:buNone/>
+              <a:defRPr sz="3200" kern="1200">
+                <a:solidFill>
+                  <a:schemeClr val="tx1">
+                    <a:tint val="75000"/>
+                  </a:schemeClr>
+                </a:solidFill>
+                <a:latin typeface="+mn-lt"/>
+                <a:ea typeface="+mn-ea"/>
+                <a:cs typeface="+mn-cs"/>
+              </a:defRPr>
+            </a:lvl1pPr>
+            <a:lvl2pPr marL="457200" indent="0" algn="ctr" defTabSz="914400" rtl="0" eaLnBrk="1" latinLnBrk="0" hangingPunct="1">
+              <a:spcBef>
+                <a:spcPct val="20000"/>
+              </a:spcBef>
+              <a:buFont typeface="Arial" pitchFamily="34" charset="0"/>
+              <a:buNone/>
+              <a:defRPr sz="2800" kern="1200">
+                <a:solidFill>
+                  <a:schemeClr val="tx1">
+                    <a:tint val="75000"/>
+                  </a:schemeClr>
+                </a:solidFill>
+                <a:latin typeface="+mn-lt"/>
+                <a:ea typeface="+mn-ea"/>
+                <a:cs typeface="+mn-cs"/>
+              </a:defRPr>
+            </a:lvl2pPr>
+            <a:lvl3pPr marL="914400" indent="0" algn="ctr" defTabSz="914400" rtl="0" eaLnBrk="1" latinLnBrk="0" hangingPunct="1">
+              <a:spcBef>
+                <a:spcPct val="20000"/>
+              </a:spcBef>
+              <a:buFont typeface="Arial" pitchFamily="34" charset="0"/>
+              <a:buNone/>
+              <a:defRPr sz="2400" kern="1200">
+                <a:solidFill>
+                  <a:schemeClr val="tx1">
+                    <a:tint val="75000"/>
+                  </a:schemeClr>
+                </a:solidFill>
+                <a:latin typeface="+mn-lt"/>
+                <a:ea typeface="+mn-ea"/>
+                <a:cs typeface="+mn-cs"/>
+              </a:defRPr>
+            </a:lvl3pPr>
+            <a:lvl4pPr marL="1371600" indent="0" algn="ctr" defTabSz="914400" rtl="0" eaLnBrk="1" latinLnBrk="0" hangingPunct="1">
+              <a:spcBef>
+                <a:spcPct val="20000"/>
+              </a:spcBef>
+              <a:buFont typeface="Arial" pitchFamily="34" charset="0"/>
+              <a:buNone/>
+              <a:defRPr sz="2000" kern="1200">
+                <a:solidFill>
+                  <a:schemeClr val="tx1">
+                    <a:tint val="75000"/>
+                  </a:schemeClr>
+                </a:solidFill>
+                <a:latin typeface="+mn-lt"/>
+                <a:ea typeface="+mn-ea"/>
+                <a:cs typeface="+mn-cs"/>
+              </a:defRPr>
+            </a:lvl4pPr>
+            <a:lvl5pPr marL="1828800" indent="0" algn="ctr" defTabSz="914400" rtl="0" eaLnBrk="1" latinLnBrk="0" hangingPunct="1">
+              <a:spcBef>
+                <a:spcPct val="20000"/>
+              </a:spcBef>
+              <a:buFont typeface="Arial" pitchFamily="34" charset="0"/>
+              <a:buNone/>
+              <a:defRPr sz="2000" kern="1200">
+                <a:solidFill>
+                  <a:schemeClr val="tx1">
+                    <a:tint val="75000"/>
+                  </a:schemeClr>
+                </a:solidFill>
+                <a:latin typeface="+mn-lt"/>
+                <a:ea typeface="+mn-ea"/>
+                <a:cs typeface="+mn-cs"/>
+              </a:defRPr>
+            </a:lvl5pPr>
+            <a:lvl6pPr marL="2286000" indent="0" algn="ctr" defTabSz="914400" rtl="0" eaLnBrk="1" latinLnBrk="0" hangingPunct="1">
+              <a:spcBef>
+                <a:spcPct val="20000"/>
+              </a:spcBef>
+              <a:buFont typeface="Arial" pitchFamily="34" charset="0"/>
+              <a:buNone/>
+              <a:defRPr sz="2000" kern="1200">
+                <a:solidFill>
+                  <a:schemeClr val="tx1">
+                    <a:tint val="75000"/>
+                  </a:schemeClr>
+                </a:solidFill>
+                <a:latin typeface="+mn-lt"/>
+                <a:ea typeface="+mn-ea"/>
+                <a:cs typeface="+mn-cs"/>
+              </a:defRPr>
+            </a:lvl6pPr>
+            <a:lvl7pPr marL="2743200" indent="0" algn="ctr" defTabSz="914400" rtl="0" eaLnBrk="1" latinLnBrk="0" hangingPunct="1">
+              <a:spcBef>
+                <a:spcPct val="20000"/>
+              </a:spcBef>
+              <a:buFont typeface="Arial" pitchFamily="34" charset="0"/>
+              <a:buNone/>
+              <a:defRPr sz="2000" kern="1200">
+                <a:solidFill>
+                  <a:schemeClr val="tx1">
+                    <a:tint val="75000"/>
+                  </a:schemeClr>
+                </a:solidFill>
+                <a:latin typeface="+mn-lt"/>
+                <a:ea typeface="+mn-ea"/>
+                <a:cs typeface="+mn-cs"/>
+              </a:defRPr>
+            </a:lvl7pPr>
+            <a:lvl8pPr marL="3200400" indent="0" algn="ctr" defTabSz="914400" rtl="0" eaLnBrk="1" latinLnBrk="0" hangingPunct="1">
+              <a:spcBef>
+                <a:spcPct val="20000"/>
+              </a:spcBef>
+              <a:buFont typeface="Arial" pitchFamily="34" charset="0"/>
+              <a:buNone/>
+              <a:defRPr sz="2000" kern="1200">
+                <a:solidFill>
+                  <a:schemeClr val="tx1">
+                    <a:tint val="75000"/>
+                  </a:schemeClr>
+                </a:solidFill>
+                <a:latin typeface="+mn-lt"/>
+                <a:ea typeface="+mn-ea"/>
+                <a:cs typeface="+mn-cs"/>
+              </a:defRPr>
+            </a:lvl8pPr>
+            <a:lvl9pPr marL="3657600" indent="0" algn="ctr" defTabSz="914400" rtl="0" eaLnBrk="1" latinLnBrk="0" hangingPunct="1">
+              <a:spcBef>
+                <a:spcPct val="20000"/>
+              </a:spcBef>
+              <a:buFont typeface="Arial" pitchFamily="34" charset="0"/>
+              <a:buNone/>
+              <a:defRPr sz="2000" kern="1200">
+                <a:solidFill>
+                  <a:schemeClr val="tx1">
+                    <a:tint val="75000"/>
+                  </a:schemeClr>
+                </a:solidFill>
+                <a:latin typeface="+mn-lt"/>
+                <a:ea typeface="+mn-ea"/>
+                <a:cs typeface="+mn-cs"/>
+              </a:defRPr>
+            </a:lvl9pPr>
+          </a:lstStyle>
+          <a:p>
+            <a:r>
+              <a:rPr lang="en-US" sz="1600" dirty="0">
+                <a:solidFill>
+                  <a:schemeClr val="tx1"/>
+                </a:solidFill>
+              </a:rPr>
+              <a:t>RIGHT</a:t>
+            </a:r>
+          </a:p>
+        </p:txBody>
+      </p:sp>
+      <p:sp>
+        <p:nvSpPr>
+          <p:cNvPr id="13" name="Right Arrow 12"/>
+          <p:cNvSpPr/>
+          <p:nvPr/>
+        </p:nvSpPr>
+        <p:spPr>
+          <a:xfrm>
+            <a:off x="9637318" y="6391827"/>
+            <a:ext cx="640200" cy="289763"/>
+          </a:xfrm>
+          <a:prstGeom prst="rightArrow">
+            <a:avLst/>
+          </a:prstGeom>
+          <a:solidFill>
+            <a:schemeClr val="tx1"/>
+          </a:solidFill>
+          <a:ln>
+            <a:noFill/>
+          </a:ln>
+        </p:spPr>
+        <p:style>
+          <a:lnRef idx="1">
+            <a:schemeClr val="accent1"/>
+          </a:lnRef>
+          <a:fillRef idx="3">
+            <a:schemeClr val="accent1"/>
+          </a:fillRef>
+          <a:effectRef idx="2">
+            <a:schemeClr val="accent1"/>
+          </a:effectRef>
+          <a:fontRef idx="minor">
+            <a:schemeClr val="lt1"/>
+          </a:fontRef>
+        </p:style>
+        <p:txBody>
+          <a:bodyPr rtlCol="0" anchor="ctr"/>
+          <a:lstStyle/>
+          <a:p>
+            <a:pPr algn="ctr"/>
+            <a:endParaRPr lang="en-US"/>
+          </a:p>
+        </p:txBody>
+      </p:sp>
+      <p:pic>
+        <p:nvPicPr>
+          <p:cNvPr id="9" name="Picture 8"/>
+          <p:cNvPicPr>
+            <a:picLocks noChangeAspect="1"/>
+          </p:cNvPicPr>
+          <p:nvPr/>
+        </p:nvPicPr>
+        <p:blipFill>
+          <a:blip r:embed="rId3">
+            <a:extLst>
+              <a:ext uri="{28A0092B-C50C-407E-A947-70E740481C1C}">
+                <a14:useLocalDpi xmlns:a14="http://schemas.microsoft.com/office/drawing/2010/main" val="0"/>
+              </a:ext>
+            </a:extLst>
+          </a:blip>
+          <a:stretch>
+            <a:fillRect/>
+          </a:stretch>
+        </p:blipFill>
+        <p:spPr>
+          <a:xfrm>
+            <a:off x="10277518" y="176410"/>
+            <a:ext cx="1760561" cy="333863"/>
+          </a:xfrm>
+          <a:prstGeom prst="rect">
+            <a:avLst/>
+          </a:prstGeom>
+        </p:spPr>
+      </p:pic>
+      <p:sp>
+        <p:nvSpPr>
+          <p:cNvPr id="8" name="TextBox 7">
+            <a:extLst>
+              <a:ext uri="{FF2B5EF4-FFF2-40B4-BE49-F238E27FC236}">
+                <a16:creationId xmlns:a16="http://schemas.microsoft.com/office/drawing/2014/main" id="{5D6AEEAA-9552-114D-B68D-6A46C8AC67A9}"/>
+              </a:ext>
+            </a:extLst>
+          </p:cNvPr>
+          <p:cNvSpPr txBox="1"/>
+          <p:nvPr/>
+        </p:nvSpPr>
+        <p:spPr>
+          <a:xfrm>
+            <a:off x="4396393" y="5612179"/>
+            <a:ext cx="3399213" cy="461665"/>
+          </a:xfrm>
+          <a:prstGeom prst="rect">
+            <a:avLst/>
+          </a:prstGeom>
+          <a:noFill/>
+        </p:spPr>
+        <p:txBody>
+          <a:bodyPr wrap="square" rtlCol="0">
+            <a:spAutoFit/>
+          </a:bodyPr>
+          <a:lstStyle/>
+          <a:p>
+            <a:pPr algn="ctr"/>
+            <a:r>
+              <a:rPr lang="en-US" sz="2400" dirty="0"/>
+              <a:t>Practice Run 3</a:t>
+            </a:r>
+          </a:p>
+        </p:txBody>
+      </p:sp>
+    </p:spTree>
+    <p:extLst>
+      <p:ext uri="{BB962C8B-B14F-4D97-AF65-F5344CB8AC3E}">
+        <p14:creationId xmlns:p14="http://schemas.microsoft.com/office/powerpoint/2010/main" val="1475572374"/>
+      </p:ext>
+    </p:extLst>
+  </p:cSld>
+  <p:clrMapOvr>
+    <a:masterClrMapping/>
+  </p:clrMapOvr>
+</p:sld>
+</file>
+
+<file path=ppt/slides/slide4.xml><?xml version="1.0" encoding="utf-8"?>
+<p:sld xmlns:a="http://schemas.openxmlformats.org/drawingml/2006/main" xmlns:r="http://schemas.openxmlformats.org/officeDocument/2006/relationships" xmlns:p="http://schemas.openxmlformats.org/presentationml/2006/main">
+  <p:cSld>
+    <p:spTree>
+      <p:nvGrpSpPr>
+        <p:cNvPr id="1" name=""/>
+        <p:cNvGrpSpPr/>
+        <p:nvPr/>
+      </p:nvGrpSpPr>
+      <p:grpSpPr>
+        <a:xfrm>
+          <a:off x="0" y="0"/>
+          <a:ext cx="0" cy="0"/>
+          <a:chOff x="0" y="0"/>
+          <a:chExt cx="0" cy="0"/>
+        </a:xfrm>
+      </p:grpSpPr>
+      <p:sp>
+        <p:nvSpPr>
+          <p:cNvPr id="26" name="Title 3"/>
+          <p:cNvSpPr txBox="1">
+            <a:spLocks/>
+          </p:cNvSpPr>
+          <p:nvPr/>
+        </p:nvSpPr>
+        <p:spPr>
+          <a:xfrm>
+            <a:off x="1524000" y="6201295"/>
+            <a:ext cx="9149174" cy="656705"/>
+          </a:xfrm>
+          <a:prstGeom prst="rect">
+            <a:avLst/>
+          </a:prstGeom>
+        </p:spPr>
+        <p:txBody>
+          <a:bodyPr vert="horz" lIns="91440" tIns="45720" rIns="91440" bIns="45720" rtlCol="0" anchor="ctr">
+            <a:normAutofit/>
+          </a:bodyPr>
+          <a:lstStyle>
+            <a:lvl1pPr algn="ctr" defTabSz="914400" rtl="0" eaLnBrk="1" latinLnBrk="0" hangingPunct="1">
+              <a:spcBef>
+                <a:spcPct val="0"/>
+              </a:spcBef>
+              <a:buNone/>
+              <a:defRPr sz="4400" kern="1200">
+                <a:solidFill>
+                  <a:schemeClr val="tx1"/>
+                </a:solidFill>
+                <a:latin typeface="+mj-lt"/>
+                <a:ea typeface="+mj-ea"/>
+                <a:cs typeface="+mj-cs"/>
+              </a:defRPr>
+            </a:lvl1pPr>
+          </a:lstStyle>
+          <a:p>
+            <a:pPr marL="0" marR="0" lvl="0" indent="0" algn="ctr" defTabSz="914400" rtl="0" eaLnBrk="1" fontAlgn="auto" latinLnBrk="0" hangingPunct="1">
+              <a:lnSpc>
+                <a:spcPct val="100000"/>
+              </a:lnSpc>
+              <a:spcBef>
+                <a:spcPct val="0"/>
+              </a:spcBef>
+              <a:spcAft>
+                <a:spcPts val="0"/>
+              </a:spcAft>
+              <a:buClrTx/>
+              <a:buSzTx/>
+              <a:buFontTx/>
+              <a:buNone/>
+              <a:tabLst/>
+              <a:defRPr/>
+            </a:pPr>
+            <a:r>
+              <a:rPr kumimoji="0" lang="en-US" sz="3000" b="0" i="0" u="none" strike="noStrike" kern="1200" cap="none" spc="0" normalizeH="0" baseline="0" noProof="0" dirty="0">
+                <a:ln>
+                  <a:noFill/>
+                </a:ln>
+                <a:solidFill>
+                  <a:srgbClr val="FF0000"/>
+                </a:solidFill>
+                <a:effectLst/>
+                <a:uLnTx/>
+                <a:uFillTx/>
+                <a:latin typeface="Calibri"/>
+                <a:ea typeface="+mj-ea"/>
+                <a:cs typeface="+mj-cs"/>
+              </a:rPr>
+              <a:t>PRESS THE RIGHT </a:t>
+            </a:r>
+            <a:r>
+              <a:rPr lang="en-US" sz="3000" dirty="0">
+                <a:solidFill>
+                  <a:srgbClr val="FF0000"/>
+                </a:solidFill>
+                <a:latin typeface="Calibri"/>
+              </a:rPr>
+              <a:t>KEY</a:t>
+            </a:r>
+            <a:r>
+              <a:rPr kumimoji="0" lang="en-US" sz="3000" b="0" i="0" u="none" strike="noStrike" kern="1200" cap="none" spc="0" normalizeH="0" baseline="0" noProof="0" dirty="0">
+                <a:ln>
+                  <a:noFill/>
+                </a:ln>
+                <a:solidFill>
+                  <a:srgbClr val="FF0000"/>
+                </a:solidFill>
+                <a:effectLst/>
+                <a:uLnTx/>
+                <a:uFillTx/>
+                <a:latin typeface="Calibri"/>
+                <a:ea typeface="+mj-ea"/>
+                <a:cs typeface="+mj-cs"/>
+              </a:rPr>
+              <a:t> TO CONTINUE</a:t>
+            </a:r>
+          </a:p>
+        </p:txBody>
+      </p:sp>
+      <p:sp>
+        <p:nvSpPr>
+          <p:cNvPr id="12" name="Subtitle 8"/>
+          <p:cNvSpPr txBox="1">
+            <a:spLocks/>
+          </p:cNvSpPr>
+          <p:nvPr/>
+        </p:nvSpPr>
+        <p:spPr>
+          <a:xfrm>
+            <a:off x="9140345" y="6073844"/>
+            <a:ext cx="1532830" cy="801636"/>
+          </a:xfrm>
+          <a:prstGeom prst="rect">
+            <a:avLst/>
+          </a:prstGeom>
+        </p:spPr>
+        <p:txBody>
+          <a:bodyPr vert="horz" lIns="91440" tIns="45720" rIns="91440" bIns="45720" rtlCol="0">
+            <a:normAutofit/>
+          </a:bodyPr>
+          <a:lstStyle>
+            <a:lvl1pPr marL="0" indent="0" algn="ctr" defTabSz="914400" rtl="0" eaLnBrk="1" latinLnBrk="0" hangingPunct="1">
+              <a:spcBef>
+                <a:spcPct val="20000"/>
+              </a:spcBef>
+              <a:buFont typeface="Arial" pitchFamily="34" charset="0"/>
+              <a:buNone/>
+              <a:defRPr sz="3200" kern="1200">
+                <a:solidFill>
+                  <a:schemeClr val="tx1">
+                    <a:tint val="75000"/>
+                  </a:schemeClr>
+                </a:solidFill>
+                <a:latin typeface="+mn-lt"/>
+                <a:ea typeface="+mn-ea"/>
+                <a:cs typeface="+mn-cs"/>
+              </a:defRPr>
+            </a:lvl1pPr>
+            <a:lvl2pPr marL="457200" indent="0" algn="ctr" defTabSz="914400" rtl="0" eaLnBrk="1" latinLnBrk="0" hangingPunct="1">
+              <a:spcBef>
+                <a:spcPct val="20000"/>
+              </a:spcBef>
+              <a:buFont typeface="Arial" pitchFamily="34" charset="0"/>
+              <a:buNone/>
+              <a:defRPr sz="2800" kern="1200">
+                <a:solidFill>
+                  <a:schemeClr val="tx1">
+                    <a:tint val="75000"/>
+                  </a:schemeClr>
+                </a:solidFill>
+                <a:latin typeface="+mn-lt"/>
+                <a:ea typeface="+mn-ea"/>
+                <a:cs typeface="+mn-cs"/>
+              </a:defRPr>
+            </a:lvl2pPr>
+            <a:lvl3pPr marL="914400" indent="0" algn="ctr" defTabSz="914400" rtl="0" eaLnBrk="1" latinLnBrk="0" hangingPunct="1">
+              <a:spcBef>
+                <a:spcPct val="20000"/>
+              </a:spcBef>
+              <a:buFont typeface="Arial" pitchFamily="34" charset="0"/>
+              <a:buNone/>
+              <a:defRPr sz="2400" kern="1200">
+                <a:solidFill>
+                  <a:schemeClr val="tx1">
+                    <a:tint val="75000"/>
+                  </a:schemeClr>
+                </a:solidFill>
+                <a:latin typeface="+mn-lt"/>
+                <a:ea typeface="+mn-ea"/>
+                <a:cs typeface="+mn-cs"/>
+              </a:defRPr>
+            </a:lvl3pPr>
+            <a:lvl4pPr marL="1371600" indent="0" algn="ctr" defTabSz="914400" rtl="0" eaLnBrk="1" latinLnBrk="0" hangingPunct="1">
+              <a:spcBef>
+                <a:spcPct val="20000"/>
+              </a:spcBef>
+              <a:buFont typeface="Arial" pitchFamily="34" charset="0"/>
+              <a:buNone/>
+              <a:defRPr sz="2000" kern="1200">
+                <a:solidFill>
+                  <a:schemeClr val="tx1">
+                    <a:tint val="75000"/>
+                  </a:schemeClr>
+                </a:solidFill>
+                <a:latin typeface="+mn-lt"/>
+                <a:ea typeface="+mn-ea"/>
+                <a:cs typeface="+mn-cs"/>
+              </a:defRPr>
+            </a:lvl4pPr>
+            <a:lvl5pPr marL="1828800" indent="0" algn="ctr" defTabSz="914400" rtl="0" eaLnBrk="1" latinLnBrk="0" hangingPunct="1">
+              <a:spcBef>
+                <a:spcPct val="20000"/>
+              </a:spcBef>
+              <a:buFont typeface="Arial" pitchFamily="34" charset="0"/>
+              <a:buNone/>
+              <a:defRPr sz="2000" kern="1200">
+                <a:solidFill>
+                  <a:schemeClr val="tx1">
+                    <a:tint val="75000"/>
+                  </a:schemeClr>
+                </a:solidFill>
+                <a:latin typeface="+mn-lt"/>
+                <a:ea typeface="+mn-ea"/>
+                <a:cs typeface="+mn-cs"/>
+              </a:defRPr>
+            </a:lvl5pPr>
+            <a:lvl6pPr marL="2286000" indent="0" algn="ctr" defTabSz="914400" rtl="0" eaLnBrk="1" latinLnBrk="0" hangingPunct="1">
+              <a:spcBef>
+                <a:spcPct val="20000"/>
+              </a:spcBef>
+              <a:buFont typeface="Arial" pitchFamily="34" charset="0"/>
+              <a:buNone/>
+              <a:defRPr sz="2000" kern="1200">
+                <a:solidFill>
+                  <a:schemeClr val="tx1">
+                    <a:tint val="75000"/>
+                  </a:schemeClr>
+                </a:solidFill>
+                <a:latin typeface="+mn-lt"/>
+                <a:ea typeface="+mn-ea"/>
+                <a:cs typeface="+mn-cs"/>
+              </a:defRPr>
+            </a:lvl6pPr>
+            <a:lvl7pPr marL="2743200" indent="0" algn="ctr" defTabSz="914400" rtl="0" eaLnBrk="1" latinLnBrk="0" hangingPunct="1">
+              <a:spcBef>
+                <a:spcPct val="20000"/>
+              </a:spcBef>
+              <a:buFont typeface="Arial" pitchFamily="34" charset="0"/>
+              <a:buNone/>
+              <a:defRPr sz="2000" kern="1200">
+                <a:solidFill>
+                  <a:schemeClr val="tx1">
+                    <a:tint val="75000"/>
+                  </a:schemeClr>
+                </a:solidFill>
+                <a:latin typeface="+mn-lt"/>
+                <a:ea typeface="+mn-ea"/>
+                <a:cs typeface="+mn-cs"/>
+              </a:defRPr>
+            </a:lvl7pPr>
+            <a:lvl8pPr marL="3200400" indent="0" algn="ctr" defTabSz="914400" rtl="0" eaLnBrk="1" latinLnBrk="0" hangingPunct="1">
+              <a:spcBef>
+                <a:spcPct val="20000"/>
+              </a:spcBef>
+              <a:buFont typeface="Arial" pitchFamily="34" charset="0"/>
+              <a:buNone/>
+              <a:defRPr sz="2000" kern="1200">
+                <a:solidFill>
+                  <a:schemeClr val="tx1">
+                    <a:tint val="75000"/>
+                  </a:schemeClr>
+                </a:solidFill>
+                <a:latin typeface="+mn-lt"/>
+                <a:ea typeface="+mn-ea"/>
+                <a:cs typeface="+mn-cs"/>
+              </a:defRPr>
+            </a:lvl8pPr>
+            <a:lvl9pPr marL="3657600" indent="0" algn="ctr" defTabSz="914400" rtl="0" eaLnBrk="1" latinLnBrk="0" hangingPunct="1">
+              <a:spcBef>
+                <a:spcPct val="20000"/>
+              </a:spcBef>
+              <a:buFont typeface="Arial" pitchFamily="34" charset="0"/>
+              <a:buNone/>
+              <a:defRPr sz="2000" kern="1200">
+                <a:solidFill>
+                  <a:schemeClr val="tx1">
+                    <a:tint val="75000"/>
+                  </a:schemeClr>
+                </a:solidFill>
+                <a:latin typeface="+mn-lt"/>
+                <a:ea typeface="+mn-ea"/>
+                <a:cs typeface="+mn-cs"/>
+              </a:defRPr>
+            </a:lvl9pPr>
+          </a:lstStyle>
+          <a:p>
+            <a:pPr marL="0" marR="0" lvl="0" indent="0" algn="ctr" defTabSz="914400" rtl="0" eaLnBrk="1" fontAlgn="auto" latinLnBrk="0" hangingPunct="1">
+              <a:lnSpc>
+                <a:spcPct val="100000"/>
+              </a:lnSpc>
+              <a:spcBef>
+                <a:spcPct val="20000"/>
+              </a:spcBef>
+              <a:spcAft>
+                <a:spcPts val="0"/>
+              </a:spcAft>
+              <a:buClrTx/>
+              <a:buSzTx/>
+              <a:buFont typeface="Arial" pitchFamily="34" charset="0"/>
+              <a:buNone/>
+              <a:tabLst/>
+              <a:defRPr/>
+            </a:pPr>
+            <a:r>
+              <a:rPr kumimoji="0" lang="en-US" sz="1600" b="0" i="0" u="none" strike="noStrike" kern="1200" cap="none" spc="0" normalizeH="0" baseline="0" noProof="0" dirty="0">
+                <a:ln>
+                  <a:noFill/>
+                </a:ln>
+                <a:solidFill>
+                  <a:prstClr val="white"/>
+                </a:solidFill>
+                <a:effectLst/>
+                <a:uLnTx/>
+                <a:uFillTx/>
+                <a:latin typeface="Calibri"/>
+                <a:ea typeface="+mn-ea"/>
+                <a:cs typeface="+mn-cs"/>
+              </a:rPr>
+              <a:t>RIGHT</a:t>
+            </a:r>
+          </a:p>
+        </p:txBody>
+      </p:sp>
+      <p:sp>
+        <p:nvSpPr>
+          <p:cNvPr id="13" name="Right Arrow 12"/>
+          <p:cNvSpPr/>
+          <p:nvPr/>
+        </p:nvSpPr>
+        <p:spPr>
+          <a:xfrm>
+            <a:off x="9637318" y="6391827"/>
+            <a:ext cx="640200" cy="289763"/>
+          </a:xfrm>
+          <a:prstGeom prst="rightArrow">
+            <a:avLst/>
+          </a:prstGeom>
+          <a:solidFill>
+            <a:schemeClr val="tx1"/>
+          </a:solidFill>
+          <a:ln>
+            <a:noFill/>
+          </a:ln>
+        </p:spPr>
+        <p:style>
+          <a:lnRef idx="1">
+            <a:schemeClr val="accent1"/>
+          </a:lnRef>
+          <a:fillRef idx="3">
+            <a:schemeClr val="accent1"/>
+          </a:fillRef>
+          <a:effectRef idx="2">
+            <a:schemeClr val="accent1"/>
+          </a:effectRef>
+          <a:fontRef idx="minor">
+            <a:schemeClr val="lt1"/>
+          </a:fontRef>
+        </p:style>
+        <p:txBody>
+          <a:bodyPr rtlCol="0" anchor="ctr"/>
+          <a:lstStyle/>
+          <a:p>
             <a:pPr marL="0" marR="0" lvl="0" indent="0" algn="ctr" defTabSz="457200" rtl="0" eaLnBrk="1" fontAlgn="auto" latinLnBrk="0" hangingPunct="1">
               <a:lnSpc>
                 <a:spcPct val="100000"/>
@@ -4865,7 +5875,7 @@
 </p:sld>
 </file>
 
-<file path=ppt/slides/slide3.xml><?xml version="1.0" encoding="utf-8"?>
+<file path=ppt/slides/slide5.xml><?xml version="1.0" encoding="utf-8"?>
 <p:sld xmlns:a="http://schemas.openxmlformats.org/drawingml/2006/main" xmlns:r="http://schemas.openxmlformats.org/officeDocument/2006/relationships" xmlns:p="http://schemas.openxmlformats.org/presentationml/2006/main">
   <p:cSld>
     <p:spTree>
@@ -5249,7 +6259,7 @@
 </p:sld>
 </file>
 
-<file path=ppt/slides/slide4.xml><?xml version="1.0" encoding="utf-8"?>
+<file path=ppt/slides/slide6.xml><?xml version="1.0" encoding="utf-8"?>
 <p:sld xmlns:a="http://schemas.openxmlformats.org/drawingml/2006/main" xmlns:r="http://schemas.openxmlformats.org/officeDocument/2006/relationships" xmlns:p="http://schemas.openxmlformats.org/presentationml/2006/main">
   <p:cSld>
     <p:spTree>

</xml_diff>